<commit_message>
add gantt diagram and user stories to project management presentation
</commit_message>
<xml_diff>
--- a/02-introduction-presentation/project_management.pptx
+++ b/02-introduction-presentation/project_management.pptx
@@ -12,7 +12,7 @@
   </p:handoutMasterIdLst>
   <p:sldIdLst>
     <p:sldId id="259" r:id="rId2"/>
-    <p:sldId id="260" r:id="rId3"/>
+    <p:sldId id="266" r:id="rId3"/>
     <p:sldId id="261" r:id="rId4"/>
     <p:sldId id="263" r:id="rId5"/>
     <p:sldId id="264" r:id="rId6"/>
@@ -121,7 +121,7 @@
         <p14:section name="Standardabschnitt" id="{F40A5D0B-1603-43F9-9E54-D260B8E47FF9}">
           <p14:sldIdLst>
             <p14:sldId id="259"/>
-            <p14:sldId id="260"/>
+            <p14:sldId id="266"/>
             <p14:sldId id="261"/>
             <p14:sldId id="263"/>
             <p14:sldId id="264"/>
@@ -257,7 +257,7 @@
             <a:fld id="{350B7780-B50B-474C-85C6-0B4009B6F014}" type="datetimeFigureOut">
               <a:rPr lang="de-DE" smtClean="0"/>
               <a:pPr/>
-              <a:t>07.05.2019</a:t>
+              <a:t>08.05.2019</a:t>
             </a:fld>
             <a:endParaRPr lang="de-DE"/>
           </a:p>
@@ -419,7 +419,7 @@
             <a:fld id="{19FFB102-D3AF-431C-A902-ADE5B2A48608}" type="datetimeFigureOut">
               <a:rPr lang="de-DE" smtClean="0"/>
               <a:pPr/>
-              <a:t>07.05.2019</a:t>
+              <a:t>08.05.2019</a:t>
             </a:fld>
             <a:endParaRPr lang="de-DE"/>
           </a:p>
@@ -2523,41 +2523,38 @@
           </a:p>
         </p:txBody>
       </p:sp>
-      <p:sp>
-        <p:nvSpPr>
-          <p:cNvPr id="3" name="Inhaltsplatzhalter 2">
+      <p:pic>
+        <p:nvPicPr>
+          <p:cNvPr id="5" name="Inhaltsplatzhalter 4">
             <a:extLst>
               <a:ext uri="{FF2B5EF4-FFF2-40B4-BE49-F238E27FC236}">
-                <a16:creationId xmlns:a16="http://schemas.microsoft.com/office/drawing/2014/main" id="{03FEB977-598D-486E-84D8-0D0D6281A22B}"/>
+                <a16:creationId xmlns:a16="http://schemas.microsoft.com/office/drawing/2014/main" id="{23031266-858E-4EC1-AE23-C43689235DC4}"/>
               </a:ext>
             </a:extLst>
           </p:cNvPr>
-          <p:cNvSpPr>
-            <a:spLocks noGrp="1"/>
-          </p:cNvSpPr>
+          <p:cNvPicPr>
+            <a:picLocks noGrp="1" noChangeAspect="1"/>
+          </p:cNvPicPr>
           <p:nvPr>
             <p:ph sz="half" idx="1"/>
           </p:nvPr>
-        </p:nvSpPr>
-        <p:spPr/>
-        <p:txBody>
-          <a:bodyPr>
-            <a:normAutofit/>
-          </a:bodyPr>
-          <a:lstStyle/>
-          <a:p>
-            <a:pPr>
-              <a:buFont typeface="Arial" panose="020B0604020202020204" pitchFamily="34" charset="0"/>
-              <a:buChar char="•"/>
-            </a:pPr>
-            <a:r>
-              <a:rPr lang="de-DE"/>
-              <a:t>Gantt</a:t>
-            </a:r>
-            <a:endParaRPr lang="de-DE" dirty="0"/>
-          </a:p>
-        </p:txBody>
-      </p:sp>
+        </p:nvPicPr>
+        <p:blipFill>
+          <a:blip r:embed="rId2"/>
+          <a:stretch>
+            <a:fillRect/>
+          </a:stretch>
+        </p:blipFill>
+        <p:spPr>
+          <a:xfrm>
+            <a:off x="1608922" y="2339975"/>
+            <a:ext cx="6646881" cy="3960813"/>
+          </a:xfrm>
+          <a:prstGeom prst="rect">
+            <a:avLst/>
+          </a:prstGeom>
+        </p:spPr>
+      </p:pic>
       <p:sp>
         <p:nvSpPr>
           <p:cNvPr id="4" name="Foliennummernplatzhalter 3">
@@ -2640,7 +2637,7 @@
           <a:p>
             <a:r>
               <a:rPr lang="de-DE"/>
-              <a:t>SCRUM</a:t>
+              <a:t>User Stories</a:t>
             </a:r>
             <a:endParaRPr lang="de-DE" dirty="0"/>
           </a:p>
@@ -2665,7 +2662,7 @@
         <p:spPr/>
         <p:txBody>
           <a:bodyPr>
-            <a:normAutofit/>
+            <a:normAutofit lnSpcReduction="10000"/>
           </a:bodyPr>
           <a:lstStyle/>
           <a:p>
@@ -2674,8 +2671,91 @@
               <a:buChar char="•"/>
             </a:pPr>
             <a:r>
-              <a:rPr lang="de-DE"/>
-              <a:t>Weekly meetings/sprints</a:t>
+              <a:rPr lang="en-US"/>
+              <a:t>As </a:t>
+            </a:r>
+            <a:r>
+              <a:rPr lang="en-US" b="1"/>
+              <a:t>user</a:t>
+            </a:r>
+            <a:r>
+              <a:rPr lang="en-US"/>
+              <a:t> I want to move in VR without latency to have a realistic experience</a:t>
+            </a:r>
+          </a:p>
+          <a:p>
+            <a:pPr>
+              <a:buFont typeface="Arial" panose="020B0604020202020204" pitchFamily="34" charset="0"/>
+              <a:buChar char="•"/>
+            </a:pPr>
+            <a:endParaRPr lang="en-US"/>
+          </a:p>
+          <a:p>
+            <a:pPr>
+              <a:buFont typeface="Arial" panose="020B0604020202020204" pitchFamily="34" charset="0"/>
+              <a:buChar char="•"/>
+            </a:pPr>
+            <a:r>
+              <a:rPr lang="en-US"/>
+              <a:t>As </a:t>
+            </a:r>
+            <a:r>
+              <a:rPr lang="en-US" b="1"/>
+              <a:t>developer</a:t>
+            </a:r>
+            <a:r>
+              <a:rPr lang="en-US"/>
+              <a:t> I want to create a VR without latency in order to ensure an optimal immersion</a:t>
+            </a:r>
+          </a:p>
+          <a:p>
+            <a:pPr>
+              <a:buFont typeface="Arial" panose="020B0604020202020204" pitchFamily="34" charset="0"/>
+              <a:buChar char="•"/>
+            </a:pPr>
+            <a:endParaRPr lang="en-US"/>
+          </a:p>
+          <a:p>
+            <a:pPr>
+              <a:buFont typeface="Arial" panose="020B0604020202020204" pitchFamily="34" charset="0"/>
+              <a:buChar char="•"/>
+            </a:pPr>
+            <a:r>
+              <a:rPr lang="en-US"/>
+              <a:t>As </a:t>
+            </a:r>
+            <a:r>
+              <a:rPr lang="en-US" b="1"/>
+              <a:t>scientist</a:t>
+            </a:r>
+            <a:r>
+              <a:rPr lang="en-US"/>
+              <a:t> I want to monitor the effects of latency on the users' immersive experience in VR in order to compare various latency levels with those of various users</a:t>
+            </a:r>
+          </a:p>
+          <a:p>
+            <a:pPr>
+              <a:buFont typeface="Arial" panose="020B0604020202020204" pitchFamily="34" charset="0"/>
+              <a:buChar char="•"/>
+            </a:pPr>
+            <a:endParaRPr lang="en-US"/>
+          </a:p>
+          <a:p>
+            <a:pPr>
+              <a:buFont typeface="Arial" panose="020B0604020202020204" pitchFamily="34" charset="0"/>
+              <a:buChar char="•"/>
+            </a:pPr>
+            <a:r>
+              <a:rPr lang="en-US"/>
+              <a:t>As </a:t>
+            </a:r>
+            <a:r>
+              <a:rPr lang="en-US" b="1"/>
+              <a:t>scientist</a:t>
+            </a:r>
+            <a:r>
+              <a:rPr lang="en-US"/>
+              <a:t> I want to measure the effects of latency towards the users' performance in VR in order to quantify those.</a:t>
             </a:r>
             <a:endParaRPr lang="de-DE" dirty="0"/>
           </a:p>
@@ -2713,7 +2793,7 @@
     </p:spTree>
     <p:extLst>
       <p:ext uri="{BB962C8B-B14F-4D97-AF65-F5344CB8AC3E}">
-        <p14:creationId xmlns:p14="http://schemas.microsoft.com/office/powerpoint/2010/main" val="3880103338"/>
+        <p14:creationId xmlns:p14="http://schemas.microsoft.com/office/powerpoint/2010/main" val="1434567725"/>
       </p:ext>
     </p:extLst>
   </p:cSld>

</xml_diff>